<commit_message>
cht: add Legend.horz_offset getter
Along the way, extract string and token enumeration types out to
xEnumerationType in oxml.simpletypes
</commit_message>
<xml_diff>
--- a/features/steps/test_files/cht-legend-props.pptx
+++ b/features/steps/test_files/cht-legend-props.pptx
@@ -614,8 +614,8 @@
       <c:legendPos val="r"/>
       <c:layout>
         <c:manualLayout>
-          <c:xMode val="edge"/>
-          <c:yMode val="edge"/>
+          <c:xMode val="factor"/>
+          <c:yMode val="factor"/>
           <c:x val="-0.5"/>
         </c:manualLayout>
       </c:layout>
@@ -883,8 +883,8 @@
       <c:legendPos val="r"/>
       <c:layout>
         <c:manualLayout>
-          <c:xMode val="edge"/>
-          <c:yMode val="edge"/>
+          <c:xMode val="factor"/>
+          <c:yMode val="factor"/>
           <c:x val="0.42"/>
         </c:manualLayout>
       </c:layout>

</xml_diff>